<commit_message>
Updates to PPP and edits to DG diagrams
</commit_message>
<xml_diff>
--- a/docs/diagrams/AddGuestSequenceDiagram.pptx
+++ b/docs/diagrams/AddGuestSequenceDiagram.pptx
@@ -5075,7 +5075,7 @@
         </p:nvCxnSpPr>
         <p:spPr>
           <a:xfrm>
-            <a:off x="6611933" y="1473017"/>
+            <a:off x="6383425" y="1471921"/>
             <a:ext cx="34381" cy="5105137"/>
           </a:xfrm>
           <a:prstGeom prst="line">
@@ -5238,7 +5238,7 @@
         </p:nvCxnSpPr>
         <p:spPr>
           <a:xfrm>
-            <a:off x="6429415" y="2596502"/>
+            <a:off x="6423909" y="2538658"/>
             <a:ext cx="1284506" cy="0"/>
           </a:xfrm>
           <a:prstGeom prst="straightConnector1">
@@ -6647,7 +6647,7 @@
         </p:nvCxnSpPr>
         <p:spPr>
           <a:xfrm>
-            <a:off x="6461803" y="3108280"/>
+            <a:off x="6451216" y="3050436"/>
             <a:ext cx="1284506" cy="0"/>
           </a:xfrm>
           <a:prstGeom prst="straightConnector1">
@@ -7057,6 +7057,52 @@
           </a:p>
         </p:txBody>
       </p:sp>
+      <p:cxnSp>
+        <p:nvCxnSpPr>
+          <p:cNvPr id="74" name="Straight Arrow Connector 73">
+            <a:extLst>
+              <a:ext uri="{FF2B5EF4-FFF2-40B4-BE49-F238E27FC236}">
+                <a16:creationId xmlns:a16="http://schemas.microsoft.com/office/drawing/2014/main" id="{1F02419B-0F76-44B8-BFEA-C275F6ED343B}"/>
+              </a:ext>
+            </a:extLst>
+          </p:cNvPr>
+          <p:cNvCxnSpPr>
+            <a:cxnSpLocks/>
+          </p:cNvCxnSpPr>
+          <p:nvPr/>
+        </p:nvCxnSpPr>
+        <p:spPr>
+          <a:xfrm flipV="1">
+            <a:off x="6451216" y="3224404"/>
+            <a:ext cx="1282625" cy="4474"/>
+          </a:xfrm>
+          <a:prstGeom prst="straightConnector1">
+            <a:avLst/>
+          </a:prstGeom>
+          <a:ln w="19050">
+            <a:solidFill>
+              <a:srgbClr val="7030A0"/>
+            </a:solidFill>
+            <a:prstDash val="sysDash"/>
+            <a:headEnd type="arrow" w="med" len="med"/>
+            <a:tailEnd type="none" w="med" len="med"/>
+          </a:ln>
+        </p:spPr>
+        <p:style>
+          <a:lnRef idx="1">
+            <a:schemeClr val="accent1"/>
+          </a:lnRef>
+          <a:fillRef idx="0">
+            <a:schemeClr val="accent1"/>
+          </a:fillRef>
+          <a:effectRef idx="0">
+            <a:schemeClr val="accent1"/>
+          </a:effectRef>
+          <a:fontRef idx="minor">
+            <a:schemeClr val="tx1"/>
+          </a:fontRef>
+        </p:style>
+      </p:cxnSp>
     </p:spTree>
     <p:extLst>
       <p:ext uri="{BB962C8B-B14F-4D97-AF65-F5344CB8AC3E}">

</xml_diff>